<commit_message>
Adding new interim and final output .csvs. Also updating documentation with new scoring
</commit_message>
<xml_diff>
--- a/docs/Approach to Analyzing Founder Ownership in PropTech Companies.pptx
+++ b/docs/Approach to Analyzing Founder Ownership in PropTech Companies.pptx
@@ -4688,7 +4688,7 @@
 <dgm:dataModel xmlns:dgm="http://schemas.openxmlformats.org/drawingml/2006/diagram" xmlns:a="http://schemas.openxmlformats.org/drawingml/2006/main">
   <dgm:ptLst>
     <dgm:pt modelId="{B9C05AED-BEFB-47E3-8D91-5A9C984690D0}" type="doc">
-      <dgm:prSet loTypeId="urn:microsoft.com/office/officeart/2005/8/layout/process4" loCatId="process" qsTypeId="urn:microsoft.com/office/officeart/2005/8/quickstyle/simple1" qsCatId="simple" csTypeId="urn:microsoft.com/office/officeart/2005/8/colors/colorful1" csCatId="colorful"/>
+      <dgm:prSet loTypeId="urn:microsoft.com/office/officeart/2005/8/layout/process4" loCatId="process" qsTypeId="urn:microsoft.com/office/officeart/2005/8/quickstyle/simple1" qsCatId="simple" csTypeId="urn:microsoft.com/office/officeart/2005/8/colors/colorful1" csCatId="colorful" phldr="1"/>
       <dgm:spPr/>
       <dgm:t>
         <a:bodyPr/>
@@ -4751,14 +4751,14 @@
         <a:lstStyle/>
         <a:p>
           <a:r>
-            <a:rPr lang="en-US" b="1" i="0" baseline="0"/>
-            <a:t>+2</a:t>
+            <a:rPr lang="en-US" b="1" i="0" baseline="0" dirty="0"/>
+            <a:t>+3</a:t>
           </a:r>
           <a:r>
-            <a:rPr lang="en-US" b="0" i="0" baseline="0"/>
+            <a:rPr lang="en-US" b="0" i="0" baseline="0" dirty="0"/>
             <a:t>: Founder-owned</a:t>
           </a:r>
-          <a:endParaRPr lang="en-US"/>
+          <a:endParaRPr lang="en-US" dirty="0"/>
         </a:p>
       </dgm:t>
     </dgm:pt>
@@ -4792,14 +4792,14 @@
         <a:lstStyle/>
         <a:p>
           <a:r>
-            <a:rPr lang="en-US" b="1" i="0" baseline="0"/>
-            <a:t>+1</a:t>
+            <a:rPr lang="en-US" b="1" i="0" baseline="0" dirty="0"/>
+            <a:t>+2</a:t>
           </a:r>
           <a:r>
-            <a:rPr lang="en-US" b="0" i="0" baseline="0"/>
+            <a:rPr lang="en-US" b="0" i="0" baseline="0" dirty="0"/>
             <a:t>: Founder on management team</a:t>
           </a:r>
-          <a:endParaRPr lang="en-US"/>
+          <a:endParaRPr lang="en-US" dirty="0"/>
         </a:p>
       </dgm:t>
     </dgm:pt>
@@ -4833,14 +4833,14 @@
         <a:lstStyle/>
         <a:p>
           <a:r>
-            <a:rPr lang="en-US" b="1" i="0" baseline="0"/>
+            <a:rPr lang="en-US" b="1" i="0" baseline="0" dirty="0"/>
             <a:t>+1</a:t>
           </a:r>
           <a:r>
-            <a:rPr lang="en-US" b="0" i="0" baseline="0"/>
-            <a:t>: Not majority acquired</a:t>
+            <a:rPr lang="en-US" b="0" i="0" baseline="0" dirty="0"/>
+            <a:t>: Founder on Board</a:t>
           </a:r>
-          <a:endParaRPr lang="en-US"/>
+          <a:endParaRPr lang="en-US" dirty="0"/>
         </a:p>
       </dgm:t>
     </dgm:pt>
@@ -4915,10 +4915,10 @@
         <a:lstStyle/>
         <a:p>
           <a:r>
-            <a:rPr lang="en-US" b="0" i="0" baseline="0"/>
-            <a:t>High (3+ points)</a:t>
+            <a:rPr lang="en-US" b="0" i="0" baseline="0" dirty="0"/>
+            <a:t>High (5+ points)</a:t>
           </a:r>
-          <a:endParaRPr lang="en-US"/>
+          <a:endParaRPr lang="en-US" dirty="0"/>
         </a:p>
       </dgm:t>
     </dgm:pt>
@@ -4952,10 +4952,10 @@
         <a:lstStyle/>
         <a:p>
           <a:r>
-            <a:rPr lang="en-US" b="0" i="0" baseline="0"/>
-            <a:t>Medium (2 points)</a:t>
+            <a:rPr lang="en-US" b="0" i="0" baseline="0" dirty="0"/>
+            <a:t>Medium (3+ points)</a:t>
           </a:r>
-          <a:endParaRPr lang="en-US"/>
+          <a:endParaRPr lang="en-US" dirty="0"/>
         </a:p>
       </dgm:t>
     </dgm:pt>
@@ -4990,7 +4990,7 @@
         <a:p>
           <a:r>
             <a:rPr lang="en-US" b="0" i="0" baseline="0"/>
-            <a:t>Low (≤1 point)</a:t>
+            <a:t>Low (&lt;3 points)</a:t>
           </a:r>
           <a:endParaRPr lang="en-US"/>
         </a:p>
@@ -5138,7 +5138,7 @@
       <dgm:spPr/>
     </dgm:pt>
     <dgm:pt modelId="{CA75502B-DFBE-4E00-9F90-D34A25BA821D}" type="pres">
-      <dgm:prSet presAssocID="{0DF6922A-1796-4F71-AF81-8F5ECFF91E79}" presName="childTextArrow" presStyleLbl="fgAccFollowNode1" presStyleIdx="3" presStyleCnt="6">
+      <dgm:prSet presAssocID="{0DF6922A-1796-4F71-AF81-8F5ECFF91E79}" presName="childTextArrow" presStyleLbl="fgAccFollowNode1" presStyleIdx="3" presStyleCnt="6" custScaleX="22288" custLinFactNeighborX="-14795" custLinFactNeighborY="-5137">
         <dgm:presLayoutVars>
           <dgm:bulletEnabled val="1"/>
         </dgm:presLayoutVars>
@@ -5146,7 +5146,7 @@
       <dgm:spPr/>
     </dgm:pt>
     <dgm:pt modelId="{20E1D49C-A38D-4958-A83B-4FDD3ADF82AA}" type="pres">
-      <dgm:prSet presAssocID="{2B14DE3F-50A9-46EC-9EA4-6A117BB3E326}" presName="childTextArrow" presStyleLbl="fgAccFollowNode1" presStyleIdx="4" presStyleCnt="6">
+      <dgm:prSet presAssocID="{2B14DE3F-50A9-46EC-9EA4-6A117BB3E326}" presName="childTextArrow" presStyleLbl="fgAccFollowNode1" presStyleIdx="4" presStyleCnt="6" custScaleX="26770" custLinFactNeighborX="-11908" custLinFactNeighborY="-3110">
         <dgm:presLayoutVars>
           <dgm:bulletEnabled val="1"/>
         </dgm:presLayoutVars>
@@ -5154,7 +5154,7 @@
       <dgm:spPr/>
     </dgm:pt>
     <dgm:pt modelId="{F0BEE4D6-35C7-435A-A904-424C1FF93D16}" type="pres">
-      <dgm:prSet presAssocID="{493C059A-C22F-4496-A2BF-FCC10742ED7E}" presName="childTextArrow" presStyleLbl="fgAccFollowNode1" presStyleIdx="5" presStyleCnt="6">
+      <dgm:prSet presAssocID="{493C059A-C22F-4496-A2BF-FCC10742ED7E}" presName="childTextArrow" presStyleLbl="fgAccFollowNode1" presStyleIdx="5" presStyleCnt="6" custScaleX="26647" custLinFactNeighborX="-11749" custLinFactNeighborY="-1248">
         <dgm:presLayoutVars>
           <dgm:bulletEnabled val="1"/>
         </dgm:presLayoutVars>
@@ -7016,10 +7016,10 @@
             <a:buNone/>
           </a:pPr>
           <a:r>
-            <a:rPr lang="en-US" sz="1500" b="0" i="0" kern="1200" baseline="0"/>
-            <a:t>High (3+ points)</a:t>
+            <a:rPr lang="en-US" sz="1500" b="0" i="0" kern="1200" baseline="0" dirty="0"/>
+            <a:t>High (5+ points)</a:t>
           </a:r>
-          <a:endParaRPr lang="en-US" sz="1500" kern="1200"/>
+          <a:endParaRPr lang="en-US" sz="1500" kern="1200" dirty="0"/>
         </a:p>
       </dsp:txBody>
       <dsp:txXfrm>
@@ -7096,10 +7096,10 @@
             <a:buNone/>
           </a:pPr>
           <a:r>
-            <a:rPr lang="en-US" sz="1500" b="0" i="0" kern="1200" baseline="0"/>
-            <a:t>Medium (2 points)</a:t>
+            <a:rPr lang="en-US" sz="1500" b="0" i="0" kern="1200" baseline="0" dirty="0"/>
+            <a:t>Medium (3+ points)</a:t>
           </a:r>
-          <a:endParaRPr lang="en-US" sz="1500" kern="1200"/>
+          <a:endParaRPr lang="en-US" sz="1500" kern="1200" dirty="0"/>
         </a:p>
       </dsp:txBody>
       <dsp:txXfrm>
@@ -7177,7 +7177,7 @@
           </a:pPr>
           <a:r>
             <a:rPr lang="en-US" sz="1500" b="0" i="0" kern="1200" baseline="0"/>
-            <a:t>Low (≤1 point)</a:t>
+            <a:t>Low (&lt;3 points)</a:t>
           </a:r>
           <a:endParaRPr lang="en-US" sz="1500" kern="1200"/>
         </a:p>
@@ -7280,8 +7280,8 @@
       </dsp:nvSpPr>
       <dsp:spPr>
         <a:xfrm>
-          <a:off x="4696" y="546703"/>
-          <a:ext cx="3202913" cy="465094"/>
+          <a:off x="0" y="522811"/>
+          <a:ext cx="2143689" cy="465094"/>
         </a:xfrm>
         <a:prstGeom prst="rect">
           <a:avLst/>
@@ -7342,19 +7342,19 @@
             <a:buNone/>
           </a:pPr>
           <a:r>
-            <a:rPr lang="en-US" sz="1500" b="1" i="0" kern="1200" baseline="0"/>
-            <a:t>+2</a:t>
+            <a:rPr lang="en-US" sz="1500" b="1" i="0" kern="1200" baseline="0" dirty="0"/>
+            <a:t>+3</a:t>
           </a:r>
           <a:r>
-            <a:rPr lang="en-US" sz="1500" b="0" i="0" kern="1200" baseline="0"/>
+            <a:rPr lang="en-US" sz="1500" b="0" i="0" kern="1200" baseline="0" dirty="0"/>
             <a:t>: Founder-owned</a:t>
           </a:r>
-          <a:endParaRPr lang="en-US" sz="1500" kern="1200"/>
+          <a:endParaRPr lang="en-US" sz="1500" kern="1200" dirty="0"/>
         </a:p>
       </dsp:txBody>
       <dsp:txXfrm>
-        <a:off x="4696" y="546703"/>
-        <a:ext cx="3202913" cy="465094"/>
+        <a:off x="0" y="522811"/>
+        <a:ext cx="2143689" cy="465094"/>
       </dsp:txXfrm>
     </dsp:sp>
     <dsp:sp modelId="{20E1D49C-A38D-4958-A83B-4FDD3ADF82AA}">
@@ -7364,8 +7364,8 @@
       </dsp:nvSpPr>
       <dsp:spPr>
         <a:xfrm>
-          <a:off x="3207609" y="546703"/>
-          <a:ext cx="3202913" cy="465094"/>
+          <a:off x="2166724" y="532239"/>
+          <a:ext cx="2574774" cy="465094"/>
         </a:xfrm>
         <a:prstGeom prst="rect">
           <a:avLst/>
@@ -7426,19 +7426,19 @@
             <a:buNone/>
           </a:pPr>
           <a:r>
-            <a:rPr lang="en-US" sz="1500" b="1" i="0" kern="1200" baseline="0"/>
-            <a:t>+1</a:t>
+            <a:rPr lang="en-US" sz="1500" b="1" i="0" kern="1200" baseline="0" dirty="0"/>
+            <a:t>+2</a:t>
           </a:r>
           <a:r>
-            <a:rPr lang="en-US" sz="1500" b="0" i="0" kern="1200" baseline="0"/>
+            <a:rPr lang="en-US" sz="1500" b="0" i="0" kern="1200" baseline="0" dirty="0"/>
             <a:t>: Founder on management team</a:t>
           </a:r>
-          <a:endParaRPr lang="en-US" sz="1500" kern="1200"/>
+          <a:endParaRPr lang="en-US" sz="1500" kern="1200" dirty="0"/>
         </a:p>
       </dsp:txBody>
       <dsp:txXfrm>
-        <a:off x="3207609" y="546703"/>
-        <a:ext cx="3202913" cy="465094"/>
+        <a:off x="2166724" y="532239"/>
+        <a:ext cx="2574774" cy="465094"/>
       </dsp:txXfrm>
     </dsp:sp>
     <dsp:sp modelId="{F0BEE4D6-35C7-435A-A904-424C1FF93D16}">
@@ -7448,8 +7448,8 @@
       </dsp:nvSpPr>
       <dsp:spPr>
         <a:xfrm>
-          <a:off x="6410523" y="546703"/>
-          <a:ext cx="3202913" cy="465094"/>
+          <a:off x="4756791" y="540899"/>
+          <a:ext cx="2562943" cy="465094"/>
         </a:xfrm>
         <a:prstGeom prst="rect">
           <a:avLst/>
@@ -7510,19 +7510,19 @@
             <a:buNone/>
           </a:pPr>
           <a:r>
-            <a:rPr lang="en-US" sz="1500" b="1" i="0" kern="1200" baseline="0"/>
+            <a:rPr lang="en-US" sz="1500" b="1" i="0" kern="1200" baseline="0" dirty="0"/>
             <a:t>+1</a:t>
           </a:r>
           <a:r>
-            <a:rPr lang="en-US" sz="1500" b="0" i="0" kern="1200" baseline="0"/>
-            <a:t>: Not majority acquired</a:t>
+            <a:rPr lang="en-US" sz="1500" b="0" i="0" kern="1200" baseline="0" dirty="0"/>
+            <a:t>: Founder on Board</a:t>
           </a:r>
-          <a:endParaRPr lang="en-US" sz="1500" kern="1200"/>
+          <a:endParaRPr lang="en-US" sz="1500" kern="1200" dirty="0"/>
         </a:p>
       </dsp:txBody>
       <dsp:txXfrm>
-        <a:off x="6410523" y="546703"/>
-        <a:ext cx="3202913" cy="465094"/>
+        <a:off x="4756791" y="540899"/>
+        <a:ext cx="2562943" cy="465094"/>
       </dsp:txXfrm>
     </dsp:sp>
   </dsp:spTree>
@@ -14147,7 +14147,7 @@
           <a:p>
             <a:fld id="{3435E48E-BB21-4BF6-899D-F5179CD48B1B}" type="datetimeFigureOut">
               <a:rPr lang="en-US" smtClean="0"/>
-              <a:t>8/22/2025</a:t>
+              <a:t>8/24/2025</a:t>
             </a:fld>
             <a:endParaRPr lang="en-US"/>
           </a:p>
@@ -14398,7 +14398,7 @@
           <a:p>
             <a:fld id="{3435E48E-BB21-4BF6-899D-F5179CD48B1B}" type="datetimeFigureOut">
               <a:rPr lang="en-US" smtClean="0"/>
-              <a:t>8/22/2025</a:t>
+              <a:t>8/24/2025</a:t>
             </a:fld>
             <a:endParaRPr lang="en-US"/>
           </a:p>
@@ -14712,7 +14712,7 @@
           <a:p>
             <a:fld id="{3435E48E-BB21-4BF6-899D-F5179CD48B1B}" type="datetimeFigureOut">
               <a:rPr lang="en-US" smtClean="0"/>
-              <a:t>8/22/2025</a:t>
+              <a:t>8/24/2025</a:t>
             </a:fld>
             <a:endParaRPr lang="en-US"/>
           </a:p>
@@ -15053,7 +15053,7 @@
           <a:p>
             <a:fld id="{3435E48E-BB21-4BF6-899D-F5179CD48B1B}" type="datetimeFigureOut">
               <a:rPr lang="en-US" smtClean="0"/>
-              <a:t>8/22/2025</a:t>
+              <a:t>8/24/2025</a:t>
             </a:fld>
             <a:endParaRPr lang="en-US"/>
           </a:p>
@@ -15367,7 +15367,7 @@
           <a:p>
             <a:fld id="{3435E48E-BB21-4BF6-899D-F5179CD48B1B}" type="datetimeFigureOut">
               <a:rPr lang="en-US" smtClean="0"/>
-              <a:t>8/22/2025</a:t>
+              <a:t>8/24/2025</a:t>
             </a:fld>
             <a:endParaRPr lang="en-US"/>
           </a:p>
@@ -15760,7 +15760,7 @@
           <a:p>
             <a:fld id="{3435E48E-BB21-4BF6-899D-F5179CD48B1B}" type="datetimeFigureOut">
               <a:rPr lang="en-US" smtClean="0"/>
-              <a:t>8/22/2025</a:t>
+              <a:t>8/24/2025</a:t>
             </a:fld>
             <a:endParaRPr lang="en-US"/>
           </a:p>
@@ -15930,7 +15930,7 @@
           <a:p>
             <a:fld id="{3435E48E-BB21-4BF6-899D-F5179CD48B1B}" type="datetimeFigureOut">
               <a:rPr lang="en-US" smtClean="0"/>
-              <a:t>8/22/2025</a:t>
+              <a:t>8/24/2025</a:t>
             </a:fld>
             <a:endParaRPr lang="en-US"/>
           </a:p>
@@ -16110,7 +16110,7 @@
           <a:p>
             <a:fld id="{3435E48E-BB21-4BF6-899D-F5179CD48B1B}" type="datetimeFigureOut">
               <a:rPr lang="en-US" smtClean="0"/>
-              <a:t>8/22/2025</a:t>
+              <a:t>8/24/2025</a:t>
             </a:fld>
             <a:endParaRPr lang="en-US"/>
           </a:p>
@@ -16286,7 +16286,7 @@
           <a:p>
             <a:fld id="{3435E48E-BB21-4BF6-899D-F5179CD48B1B}" type="datetimeFigureOut">
               <a:rPr lang="en-US" smtClean="0"/>
-              <a:t>8/22/2025</a:t>
+              <a:t>8/24/2025</a:t>
             </a:fld>
             <a:endParaRPr lang="en-US"/>
           </a:p>
@@ -16533,7 +16533,7 @@
           <a:p>
             <a:fld id="{3435E48E-BB21-4BF6-899D-F5179CD48B1B}" type="datetimeFigureOut">
               <a:rPr lang="en-US" smtClean="0"/>
-              <a:t>8/22/2025</a:t>
+              <a:t>8/24/2025</a:t>
             </a:fld>
             <a:endParaRPr lang="en-US"/>
           </a:p>
@@ -16765,7 +16765,7 @@
           <a:p>
             <a:fld id="{3435E48E-BB21-4BF6-899D-F5179CD48B1B}" type="datetimeFigureOut">
               <a:rPr lang="en-US" smtClean="0"/>
-              <a:t>8/22/2025</a:t>
+              <a:t>8/24/2025</a:t>
             </a:fld>
             <a:endParaRPr lang="en-US"/>
           </a:p>
@@ -17139,7 +17139,7 @@
           <a:p>
             <a:fld id="{3435E48E-BB21-4BF6-899D-F5179CD48B1B}" type="datetimeFigureOut">
               <a:rPr lang="en-US" smtClean="0"/>
-              <a:t>8/22/2025</a:t>
+              <a:t>8/24/2025</a:t>
             </a:fld>
             <a:endParaRPr lang="en-US"/>
           </a:p>
@@ -17262,7 +17262,7 @@
           <a:p>
             <a:fld id="{3435E48E-BB21-4BF6-899D-F5179CD48B1B}" type="datetimeFigureOut">
               <a:rPr lang="en-US" smtClean="0"/>
-              <a:t>8/22/2025</a:t>
+              <a:t>8/24/2025</a:t>
             </a:fld>
             <a:endParaRPr lang="en-US"/>
           </a:p>
@@ -17357,7 +17357,7 @@
           <a:p>
             <a:fld id="{3435E48E-BB21-4BF6-899D-F5179CD48B1B}" type="datetimeFigureOut">
               <a:rPr lang="en-US" smtClean="0"/>
-              <a:t>8/22/2025</a:t>
+              <a:t>8/24/2025</a:t>
             </a:fld>
             <a:endParaRPr lang="en-US"/>
           </a:p>
@@ -17612,7 +17612,7 @@
           <a:p>
             <a:fld id="{3435E48E-BB21-4BF6-899D-F5179CD48B1B}" type="datetimeFigureOut">
               <a:rPr lang="en-US" smtClean="0"/>
-              <a:t>8/22/2025</a:t>
+              <a:t>8/24/2025</a:t>
             </a:fld>
             <a:endParaRPr lang="en-US"/>
           </a:p>
@@ -17875,7 +17875,7 @@
           <a:p>
             <a:fld id="{3435E48E-BB21-4BF6-899D-F5179CD48B1B}" type="datetimeFigureOut">
               <a:rPr lang="en-US" smtClean="0"/>
-              <a:t>8/22/2025</a:t>
+              <a:t>8/24/2025</a:t>
             </a:fld>
             <a:endParaRPr lang="en-US"/>
           </a:p>
@@ -18618,7 +18618,7 @@
           <a:p>
             <a:fld id="{3435E48E-BB21-4BF6-899D-F5179CD48B1B}" type="datetimeFigureOut">
               <a:rPr lang="en-US" smtClean="0"/>
-              <a:t>8/22/2025</a:t>
+              <a:t>8/24/2025</a:t>
             </a:fld>
             <a:endParaRPr lang="en-US"/>
           </a:p>
@@ -23932,7 +23932,7 @@
             <p:ph idx="1"/>
             <p:extLst>
               <p:ext uri="{D42A27DB-BD31-4B8C-83A1-F6EECF244321}">
-                <p14:modId xmlns:p14="http://schemas.microsoft.com/office/powerpoint/2010/main" val="1494283348"/>
+                <p14:modId xmlns:p14="http://schemas.microsoft.com/office/powerpoint/2010/main" val="995173207"/>
               </p:ext>
             </p:extLst>
           </p:nvPr>
@@ -23947,6 +23947,166 @@
           </a:graphicData>
         </a:graphic>
       </p:graphicFrame>
+      <p:grpSp>
+        <p:nvGrpSpPr>
+          <p:cNvPr id="3" name="Group 2">
+            <a:extLst>
+              <a:ext uri="{FF2B5EF4-FFF2-40B4-BE49-F238E27FC236}">
+                <a16:creationId xmlns:a16="http://schemas.microsoft.com/office/drawing/2014/main" id="{A024DA99-6DB8-099A-C968-0880EDACE07D}"/>
+              </a:ext>
+            </a:extLst>
+          </p:cNvPr>
+          <p:cNvGrpSpPr/>
+          <p:nvPr/>
+        </p:nvGrpSpPr>
+        <p:grpSpPr>
+          <a:xfrm>
+            <a:off x="8634953" y="2486827"/>
+            <a:ext cx="2270113" cy="467711"/>
+            <a:chOff x="5274398" y="518426"/>
+            <a:chExt cx="2270113" cy="465094"/>
+          </a:xfrm>
+        </p:grpSpPr>
+        <p:sp>
+          <p:nvSpPr>
+            <p:cNvPr id="4" name="Rectangle 3">
+              <a:extLst>
+                <a:ext uri="{FF2B5EF4-FFF2-40B4-BE49-F238E27FC236}">
+                  <a16:creationId xmlns:a16="http://schemas.microsoft.com/office/drawing/2014/main" id="{C5878685-6D8C-328B-F192-FEFCD374779D}"/>
+                </a:ext>
+              </a:extLst>
+            </p:cNvPr>
+            <p:cNvSpPr/>
+            <p:nvPr/>
+          </p:nvSpPr>
+          <p:spPr>
+            <a:xfrm>
+              <a:off x="5274398" y="518426"/>
+              <a:ext cx="2270113" cy="465094"/>
+            </a:xfrm>
+            <a:prstGeom prst="rect">
+              <a:avLst/>
+            </a:prstGeom>
+          </p:spPr>
+          <p:style>
+            <a:lnRef idx="2">
+              <a:schemeClr val="accent2">
+                <a:tint val="40000"/>
+                <a:alpha val="90000"/>
+                <a:hueOff val="0"/>
+                <a:satOff val="0"/>
+                <a:lumOff val="0"/>
+                <a:alphaOff val="0"/>
+              </a:schemeClr>
+            </a:lnRef>
+            <a:fillRef idx="1">
+              <a:schemeClr val="accent2">
+                <a:tint val="40000"/>
+                <a:alpha val="90000"/>
+                <a:hueOff val="0"/>
+                <a:satOff val="0"/>
+                <a:lumOff val="0"/>
+                <a:alphaOff val="0"/>
+              </a:schemeClr>
+            </a:fillRef>
+            <a:effectRef idx="0">
+              <a:schemeClr val="accent2">
+                <a:tint val="40000"/>
+                <a:alpha val="90000"/>
+                <a:hueOff val="0"/>
+                <a:satOff val="0"/>
+                <a:lumOff val="0"/>
+                <a:alphaOff val="0"/>
+              </a:schemeClr>
+            </a:effectRef>
+            <a:fontRef idx="minor">
+              <a:schemeClr val="dk1">
+                <a:hueOff val="0"/>
+                <a:satOff val="0"/>
+                <a:lumOff val="0"/>
+                <a:alphaOff val="0"/>
+              </a:schemeClr>
+            </a:fontRef>
+          </p:style>
+          <p:txBody>
+            <a:bodyPr/>
+            <a:lstStyle/>
+            <a:p>
+              <a:endParaRPr lang="en-US"/>
+            </a:p>
+          </p:txBody>
+        </p:sp>
+        <p:sp>
+          <p:nvSpPr>
+            <p:cNvPr id="5" name="TextBox 4">
+              <a:extLst>
+                <a:ext uri="{FF2B5EF4-FFF2-40B4-BE49-F238E27FC236}">
+                  <a16:creationId xmlns:a16="http://schemas.microsoft.com/office/drawing/2014/main" id="{37B5ED6B-B656-114F-4CAA-5A75FCFE6017}"/>
+                </a:ext>
+              </a:extLst>
+            </p:cNvPr>
+            <p:cNvSpPr txBox="1"/>
+            <p:nvPr/>
+          </p:nvSpPr>
+          <p:spPr>
+            <a:xfrm>
+              <a:off x="5274398" y="518426"/>
+              <a:ext cx="2147565" cy="465094"/>
+            </a:xfrm>
+            <a:prstGeom prst="rect">
+              <a:avLst/>
+            </a:prstGeom>
+          </p:spPr>
+          <p:style>
+            <a:lnRef idx="0">
+              <a:scrgbClr r="0" g="0" b="0"/>
+            </a:lnRef>
+            <a:fillRef idx="0">
+              <a:scrgbClr r="0" g="0" b="0"/>
+            </a:fillRef>
+            <a:effectRef idx="0">
+              <a:scrgbClr r="0" g="0" b="0"/>
+            </a:effectRef>
+            <a:fontRef idx="minor">
+              <a:schemeClr val="dk1">
+                <a:hueOff val="0"/>
+                <a:satOff val="0"/>
+                <a:lumOff val="0"/>
+                <a:alphaOff val="0"/>
+              </a:schemeClr>
+            </a:fontRef>
+          </p:style>
+          <p:txBody>
+            <a:bodyPr spcFirstLastPara="0" vert="horz" wrap="square" lIns="106680" tIns="19050" rIns="106680" bIns="19050" numCol="1" spcCol="1270" anchor="ctr" anchorCtr="0">
+              <a:noAutofit/>
+            </a:bodyPr>
+            <a:lstStyle/>
+            <a:p>
+              <a:pPr marL="0" lvl="0" indent="0" algn="ctr" defTabSz="666750">
+                <a:lnSpc>
+                  <a:spcPct val="90000"/>
+                </a:lnSpc>
+                <a:spcBef>
+                  <a:spcPct val="0"/>
+                </a:spcBef>
+                <a:spcAft>
+                  <a:spcPct val="35000"/>
+                </a:spcAft>
+                <a:buNone/>
+              </a:pPr>
+              <a:r>
+                <a:rPr lang="en-US" sz="1500" b="1" i="0" kern="1200" baseline="0" dirty="0"/>
+                <a:t>+1</a:t>
+              </a:r>
+              <a:r>
+                <a:rPr lang="en-US" sz="1500" b="0" i="0" kern="1200" baseline="0" dirty="0"/>
+                <a:t>: Not majority acquired</a:t>
+              </a:r>
+              <a:endParaRPr lang="en-US" sz="1500" kern="1200" dirty="0"/>
+            </a:p>
+          </p:txBody>
+        </p:sp>
+      </p:grpSp>
     </p:spTree>
     <p:extLst>
       <p:ext uri="{BB962C8B-B14F-4D97-AF65-F5344CB8AC3E}">

</xml_diff>